<commit_message>
Actualizo y uno aplicaciones al book
</commit_message>
<xml_diff>
--- a/img/Cumbrevieja.pptx
+++ b/img/Cumbrevieja.pptx
@@ -6,6 +6,8 @@
   </p:sldMasterIdLst>
   <p:sldIdLst>
     <p:sldId id="256" r:id="rId2"/>
+    <p:sldId id="257" r:id="rId3"/>
+    <p:sldId id="258" r:id="rId4"/>
   </p:sldIdLst>
   <p:sldSz cx="12192000" cy="6858000"/>
   <p:notesSz cx="6858000" cy="9144000"/>
@@ -259,7 +261,7 @@
           <a:p>
             <a:fld id="{FB369D5D-6434-40C6-9250-9D4B8D38C89A}" type="datetimeFigureOut">
               <a:rPr lang="es-ES" smtClean="0"/>
-              <a:t>17/01/2022</a:t>
+              <a:t>01/02/2022</a:t>
             </a:fld>
             <a:endParaRPr lang="es-ES"/>
           </a:p>
@@ -457,7 +459,7 @@
           <a:p>
             <a:fld id="{FB369D5D-6434-40C6-9250-9D4B8D38C89A}" type="datetimeFigureOut">
               <a:rPr lang="es-ES" smtClean="0"/>
-              <a:t>17/01/2022</a:t>
+              <a:t>01/02/2022</a:t>
             </a:fld>
             <a:endParaRPr lang="es-ES"/>
           </a:p>
@@ -665,7 +667,7 @@
           <a:p>
             <a:fld id="{FB369D5D-6434-40C6-9250-9D4B8D38C89A}" type="datetimeFigureOut">
               <a:rPr lang="es-ES" smtClean="0"/>
-              <a:t>17/01/2022</a:t>
+              <a:t>01/02/2022</a:t>
             </a:fld>
             <a:endParaRPr lang="es-ES"/>
           </a:p>
@@ -863,7 +865,7 @@
           <a:p>
             <a:fld id="{FB369D5D-6434-40C6-9250-9D4B8D38C89A}" type="datetimeFigureOut">
               <a:rPr lang="es-ES" smtClean="0"/>
-              <a:t>17/01/2022</a:t>
+              <a:t>01/02/2022</a:t>
             </a:fld>
             <a:endParaRPr lang="es-ES"/>
           </a:p>
@@ -1138,7 +1140,7 @@
           <a:p>
             <a:fld id="{FB369D5D-6434-40C6-9250-9D4B8D38C89A}" type="datetimeFigureOut">
               <a:rPr lang="es-ES" smtClean="0"/>
-              <a:t>17/01/2022</a:t>
+              <a:t>01/02/2022</a:t>
             </a:fld>
             <a:endParaRPr lang="es-ES"/>
           </a:p>
@@ -1403,7 +1405,7 @@
           <a:p>
             <a:fld id="{FB369D5D-6434-40C6-9250-9D4B8D38C89A}" type="datetimeFigureOut">
               <a:rPr lang="es-ES" smtClean="0"/>
-              <a:t>17/01/2022</a:t>
+              <a:t>01/02/2022</a:t>
             </a:fld>
             <a:endParaRPr lang="es-ES"/>
           </a:p>
@@ -1815,7 +1817,7 @@
           <a:p>
             <a:fld id="{FB369D5D-6434-40C6-9250-9D4B8D38C89A}" type="datetimeFigureOut">
               <a:rPr lang="es-ES" smtClean="0"/>
-              <a:t>17/01/2022</a:t>
+              <a:t>01/02/2022</a:t>
             </a:fld>
             <a:endParaRPr lang="es-ES"/>
           </a:p>
@@ -1956,7 +1958,7 @@
           <a:p>
             <a:fld id="{FB369D5D-6434-40C6-9250-9D4B8D38C89A}" type="datetimeFigureOut">
               <a:rPr lang="es-ES" smtClean="0"/>
-              <a:t>17/01/2022</a:t>
+              <a:t>01/02/2022</a:t>
             </a:fld>
             <a:endParaRPr lang="es-ES"/>
           </a:p>
@@ -2069,7 +2071,7 @@
           <a:p>
             <a:fld id="{FB369D5D-6434-40C6-9250-9D4B8D38C89A}" type="datetimeFigureOut">
               <a:rPr lang="es-ES" smtClean="0"/>
-              <a:t>17/01/2022</a:t>
+              <a:t>01/02/2022</a:t>
             </a:fld>
             <a:endParaRPr lang="es-ES"/>
           </a:p>
@@ -2380,7 +2382,7 @@
           <a:p>
             <a:fld id="{FB369D5D-6434-40C6-9250-9D4B8D38C89A}" type="datetimeFigureOut">
               <a:rPr lang="es-ES" smtClean="0"/>
-              <a:t>17/01/2022</a:t>
+              <a:t>01/02/2022</a:t>
             </a:fld>
             <a:endParaRPr lang="es-ES"/>
           </a:p>
@@ -2668,7 +2670,7 @@
           <a:p>
             <a:fld id="{FB369D5D-6434-40C6-9250-9D4B8D38C89A}" type="datetimeFigureOut">
               <a:rPr lang="es-ES" smtClean="0"/>
-              <a:t>17/01/2022</a:t>
+              <a:t>01/02/2022</a:t>
             </a:fld>
             <a:endParaRPr lang="es-ES"/>
           </a:p>
@@ -2909,7 +2911,7 @@
           <a:p>
             <a:fld id="{FB369D5D-6434-40C6-9250-9D4B8D38C89A}" type="datetimeFigureOut">
               <a:rPr lang="es-ES" smtClean="0"/>
-              <a:t>17/01/2022</a:t>
+              <a:t>01/02/2022</a:t>
             </a:fld>
             <a:endParaRPr lang="es-ES"/>
           </a:p>
@@ -3541,6 +3543,848 @@
 </p:sld>
 </file>
 
+<file path=ppt/slides/slide2.xml><?xml version="1.0" encoding="utf-8"?>
+<p:sld xmlns:a="http://schemas.openxmlformats.org/drawingml/2006/main" xmlns:r="http://schemas.openxmlformats.org/officeDocument/2006/relationships" xmlns:p="http://schemas.openxmlformats.org/presentationml/2006/main">
+  <p:cSld>
+    <p:bg>
+      <p:bgPr>
+        <a:solidFill>
+          <a:schemeClr val="bg1"/>
+        </a:solidFill>
+        <a:effectLst/>
+      </p:bgPr>
+    </p:bg>
+    <p:spTree>
+      <p:nvGrpSpPr>
+        <p:cNvPr id="1" name=""/>
+        <p:cNvGrpSpPr/>
+        <p:nvPr/>
+      </p:nvGrpSpPr>
+      <p:grpSpPr>
+        <a:xfrm>
+          <a:off x="0" y="0"/>
+          <a:ext cx="0" cy="0"/>
+          <a:chOff x="0" y="0"/>
+          <a:chExt cx="0" cy="0"/>
+        </a:xfrm>
+      </p:grpSpPr>
+      <p:pic>
+        <p:nvPicPr>
+          <p:cNvPr id="4" name="Imagen 3">
+            <a:extLst>
+              <a:ext uri="{FF2B5EF4-FFF2-40B4-BE49-F238E27FC236}">
+                <a16:creationId xmlns:a16="http://schemas.microsoft.com/office/drawing/2014/main" id="{5187AE16-C9E5-49C8-8F68-404FF7621279}"/>
+              </a:ext>
+            </a:extLst>
+          </p:cNvPr>
+          <p:cNvPicPr>
+            <a:picLocks noChangeAspect="1"/>
+          </p:cNvPicPr>
+          <p:nvPr/>
+        </p:nvPicPr>
+        <p:blipFill>
+          <a:blip r:embed="rId2"/>
+          <a:stretch>
+            <a:fillRect/>
+          </a:stretch>
+        </p:blipFill>
+        <p:spPr>
+          <a:xfrm>
+            <a:off x="1531321" y="1597891"/>
+            <a:ext cx="2783219" cy="2798618"/>
+          </a:xfrm>
+          <a:prstGeom prst="rect">
+            <a:avLst/>
+          </a:prstGeom>
+        </p:spPr>
+      </p:pic>
+      <p:pic>
+        <p:nvPicPr>
+          <p:cNvPr id="6" name="Imagen 5">
+            <a:extLst>
+              <a:ext uri="{FF2B5EF4-FFF2-40B4-BE49-F238E27FC236}">
+                <a16:creationId xmlns:a16="http://schemas.microsoft.com/office/drawing/2014/main" id="{5532E49A-617C-40A0-B4BE-DB717C9E36F3}"/>
+              </a:ext>
+            </a:extLst>
+          </p:cNvPr>
+          <p:cNvPicPr>
+            <a:picLocks noChangeAspect="1"/>
+          </p:cNvPicPr>
+          <p:nvPr/>
+        </p:nvPicPr>
+        <p:blipFill>
+          <a:blip r:embed="rId3"/>
+          <a:stretch>
+            <a:fillRect/>
+          </a:stretch>
+        </p:blipFill>
+        <p:spPr>
+          <a:xfrm>
+            <a:off x="4510798" y="1597891"/>
+            <a:ext cx="2859820" cy="2843120"/>
+          </a:xfrm>
+          <a:prstGeom prst="rect">
+            <a:avLst/>
+          </a:prstGeom>
+        </p:spPr>
+      </p:pic>
+      <p:pic>
+        <p:nvPicPr>
+          <p:cNvPr id="10" name="Imagen 9">
+            <a:extLst>
+              <a:ext uri="{FF2B5EF4-FFF2-40B4-BE49-F238E27FC236}">
+                <a16:creationId xmlns:a16="http://schemas.microsoft.com/office/drawing/2014/main" id="{8E1C7B79-4E32-423E-B799-93A46BCD00B6}"/>
+              </a:ext>
+            </a:extLst>
+          </p:cNvPr>
+          <p:cNvPicPr>
+            <a:picLocks noChangeAspect="1"/>
+          </p:cNvPicPr>
+          <p:nvPr/>
+        </p:nvPicPr>
+        <p:blipFill>
+          <a:blip r:embed="rId4"/>
+          <a:stretch>
+            <a:fillRect/>
+          </a:stretch>
+        </p:blipFill>
+        <p:spPr>
+          <a:xfrm>
+            <a:off x="7566876" y="1597891"/>
+            <a:ext cx="2941158" cy="2843120"/>
+          </a:xfrm>
+          <a:prstGeom prst="rect">
+            <a:avLst/>
+          </a:prstGeom>
+        </p:spPr>
+      </p:pic>
+      <p:sp>
+        <p:nvSpPr>
+          <p:cNvPr id="11" name="Marcador de texto 3">
+            <a:extLst>
+              <a:ext uri="{FF2B5EF4-FFF2-40B4-BE49-F238E27FC236}">
+                <a16:creationId xmlns:a16="http://schemas.microsoft.com/office/drawing/2014/main" id="{18B99C1B-39D7-437A-8CC9-0B44D821D15C}"/>
+              </a:ext>
+            </a:extLst>
+          </p:cNvPr>
+          <p:cNvSpPr txBox="1">
+            <a:spLocks/>
+          </p:cNvSpPr>
+          <p:nvPr/>
+        </p:nvSpPr>
+        <p:spPr>
+          <a:xfrm>
+            <a:off x="1688337" y="4541982"/>
+            <a:ext cx="2357188" cy="454891"/>
+          </a:xfrm>
+          <a:prstGeom prst="rect">
+            <a:avLst/>
+          </a:prstGeom>
+        </p:spPr>
+        <p:txBody>
+          <a:bodyPr/>
+          <a:lstStyle>
+            <a:lvl1pPr marL="228600" indent="-228600" algn="l" defTabSz="914400" rtl="0" eaLnBrk="1" latinLnBrk="0" hangingPunct="1">
+              <a:lnSpc>
+                <a:spcPct val="90000"/>
+              </a:lnSpc>
+              <a:spcBef>
+                <a:spcPts val="1000"/>
+              </a:spcBef>
+              <a:buFont typeface="Arial" panose="020B0604020202020204" pitchFamily="34" charset="0"/>
+              <a:buChar char="•"/>
+              <a:defRPr sz="2800" kern="1200">
+                <a:solidFill>
+                  <a:schemeClr val="tx1"/>
+                </a:solidFill>
+                <a:latin typeface="+mn-lt"/>
+                <a:ea typeface="+mn-ea"/>
+                <a:cs typeface="+mn-cs"/>
+              </a:defRPr>
+            </a:lvl1pPr>
+            <a:lvl2pPr marL="685800" indent="-228600" algn="l" defTabSz="914400" rtl="0" eaLnBrk="1" latinLnBrk="0" hangingPunct="1">
+              <a:lnSpc>
+                <a:spcPct val="90000"/>
+              </a:lnSpc>
+              <a:spcBef>
+                <a:spcPts val="500"/>
+              </a:spcBef>
+              <a:buFont typeface="Arial" panose="020B0604020202020204" pitchFamily="34" charset="0"/>
+              <a:buChar char="•"/>
+              <a:defRPr sz="2400" kern="1200">
+                <a:solidFill>
+                  <a:schemeClr val="tx1"/>
+                </a:solidFill>
+                <a:latin typeface="+mn-lt"/>
+                <a:ea typeface="+mn-ea"/>
+                <a:cs typeface="+mn-cs"/>
+              </a:defRPr>
+            </a:lvl2pPr>
+            <a:lvl3pPr marL="1143000" indent="-228600" algn="l" defTabSz="914400" rtl="0" eaLnBrk="1" latinLnBrk="0" hangingPunct="1">
+              <a:lnSpc>
+                <a:spcPct val="90000"/>
+              </a:lnSpc>
+              <a:spcBef>
+                <a:spcPts val="500"/>
+              </a:spcBef>
+              <a:buFont typeface="Arial" panose="020B0604020202020204" pitchFamily="34" charset="0"/>
+              <a:buChar char="•"/>
+              <a:defRPr sz="2000" kern="1200">
+                <a:solidFill>
+                  <a:schemeClr val="tx1"/>
+                </a:solidFill>
+                <a:latin typeface="+mn-lt"/>
+                <a:ea typeface="+mn-ea"/>
+                <a:cs typeface="+mn-cs"/>
+              </a:defRPr>
+            </a:lvl3pPr>
+            <a:lvl4pPr marL="1600200" indent="-228600" algn="l" defTabSz="914400" rtl="0" eaLnBrk="1" latinLnBrk="0" hangingPunct="1">
+              <a:lnSpc>
+                <a:spcPct val="90000"/>
+              </a:lnSpc>
+              <a:spcBef>
+                <a:spcPts val="500"/>
+              </a:spcBef>
+              <a:buFont typeface="Arial" panose="020B0604020202020204" pitchFamily="34" charset="0"/>
+              <a:buChar char="•"/>
+              <a:defRPr sz="1800" kern="1200">
+                <a:solidFill>
+                  <a:schemeClr val="tx1"/>
+                </a:solidFill>
+                <a:latin typeface="+mn-lt"/>
+                <a:ea typeface="+mn-ea"/>
+                <a:cs typeface="+mn-cs"/>
+              </a:defRPr>
+            </a:lvl4pPr>
+            <a:lvl5pPr marL="2057400" indent="-228600" algn="l" defTabSz="914400" rtl="0" eaLnBrk="1" latinLnBrk="0" hangingPunct="1">
+              <a:lnSpc>
+                <a:spcPct val="90000"/>
+              </a:lnSpc>
+              <a:spcBef>
+                <a:spcPts val="500"/>
+              </a:spcBef>
+              <a:buFont typeface="Arial" panose="020B0604020202020204" pitchFamily="34" charset="0"/>
+              <a:buChar char="•"/>
+              <a:defRPr sz="1800" kern="1200">
+                <a:solidFill>
+                  <a:schemeClr val="tx1"/>
+                </a:solidFill>
+                <a:latin typeface="+mn-lt"/>
+                <a:ea typeface="+mn-ea"/>
+                <a:cs typeface="+mn-cs"/>
+              </a:defRPr>
+            </a:lvl5pPr>
+            <a:lvl6pPr marL="2514600" indent="-228600" algn="l" defTabSz="914400" rtl="0" eaLnBrk="1" latinLnBrk="0" hangingPunct="1">
+              <a:lnSpc>
+                <a:spcPct val="90000"/>
+              </a:lnSpc>
+              <a:spcBef>
+                <a:spcPts val="500"/>
+              </a:spcBef>
+              <a:buFont typeface="Arial" panose="020B0604020202020204" pitchFamily="34" charset="0"/>
+              <a:buChar char="•"/>
+              <a:defRPr sz="1800" kern="1200">
+                <a:solidFill>
+                  <a:schemeClr val="tx1"/>
+                </a:solidFill>
+                <a:latin typeface="+mn-lt"/>
+                <a:ea typeface="+mn-ea"/>
+                <a:cs typeface="+mn-cs"/>
+              </a:defRPr>
+            </a:lvl6pPr>
+            <a:lvl7pPr marL="2971800" indent="-228600" algn="l" defTabSz="914400" rtl="0" eaLnBrk="1" latinLnBrk="0" hangingPunct="1">
+              <a:lnSpc>
+                <a:spcPct val="90000"/>
+              </a:lnSpc>
+              <a:spcBef>
+                <a:spcPts val="500"/>
+              </a:spcBef>
+              <a:buFont typeface="Arial" panose="020B0604020202020204" pitchFamily="34" charset="0"/>
+              <a:buChar char="•"/>
+              <a:defRPr sz="1800" kern="1200">
+                <a:solidFill>
+                  <a:schemeClr val="tx1"/>
+                </a:solidFill>
+                <a:latin typeface="+mn-lt"/>
+                <a:ea typeface="+mn-ea"/>
+                <a:cs typeface="+mn-cs"/>
+              </a:defRPr>
+            </a:lvl7pPr>
+            <a:lvl8pPr marL="3429000" indent="-228600" algn="l" defTabSz="914400" rtl="0" eaLnBrk="1" latinLnBrk="0" hangingPunct="1">
+              <a:lnSpc>
+                <a:spcPct val="90000"/>
+              </a:lnSpc>
+              <a:spcBef>
+                <a:spcPts val="500"/>
+              </a:spcBef>
+              <a:buFont typeface="Arial" panose="020B0604020202020204" pitchFamily="34" charset="0"/>
+              <a:buChar char="•"/>
+              <a:defRPr sz="1800" kern="1200">
+                <a:solidFill>
+                  <a:schemeClr val="tx1"/>
+                </a:solidFill>
+                <a:latin typeface="+mn-lt"/>
+                <a:ea typeface="+mn-ea"/>
+                <a:cs typeface="+mn-cs"/>
+              </a:defRPr>
+            </a:lvl8pPr>
+            <a:lvl9pPr marL="3886200" indent="-228600" algn="l" defTabSz="914400" rtl="0" eaLnBrk="1" latinLnBrk="0" hangingPunct="1">
+              <a:lnSpc>
+                <a:spcPct val="90000"/>
+              </a:lnSpc>
+              <a:spcBef>
+                <a:spcPts val="500"/>
+              </a:spcBef>
+              <a:buFont typeface="Arial" panose="020B0604020202020204" pitchFamily="34" charset="0"/>
+              <a:buChar char="•"/>
+              <a:defRPr sz="1800" kern="1200">
+                <a:solidFill>
+                  <a:schemeClr val="tx1"/>
+                </a:solidFill>
+                <a:latin typeface="+mn-lt"/>
+                <a:ea typeface="+mn-ea"/>
+                <a:cs typeface="+mn-cs"/>
+              </a:defRPr>
+            </a:lvl9pPr>
+          </a:lstStyle>
+          <a:p>
+            <a:pPr marL="0" indent="0" algn="ctr">
+              <a:buNone/>
+            </a:pPr>
+            <a:r>
+              <a:rPr lang="es-ES" sz="2000" dirty="0"/>
+              <a:t>Geoestadística</a:t>
+            </a:r>
+          </a:p>
+        </p:txBody>
+      </p:sp>
+      <p:sp>
+        <p:nvSpPr>
+          <p:cNvPr id="12" name="Marcador de texto 3">
+            <a:extLst>
+              <a:ext uri="{FF2B5EF4-FFF2-40B4-BE49-F238E27FC236}">
+                <a16:creationId xmlns:a16="http://schemas.microsoft.com/office/drawing/2014/main" id="{828960D7-F1DB-45EE-BF16-57C530132ABB}"/>
+              </a:ext>
+            </a:extLst>
+          </p:cNvPr>
+          <p:cNvSpPr txBox="1">
+            <a:spLocks/>
+          </p:cNvSpPr>
+          <p:nvPr/>
+        </p:nvSpPr>
+        <p:spPr>
+          <a:xfrm>
+            <a:off x="4814843" y="4537364"/>
+            <a:ext cx="2357188" cy="454891"/>
+          </a:xfrm>
+          <a:prstGeom prst="rect">
+            <a:avLst/>
+          </a:prstGeom>
+        </p:spPr>
+        <p:txBody>
+          <a:bodyPr/>
+          <a:lstStyle>
+            <a:lvl1pPr marL="228600" indent="-228600" algn="l" defTabSz="914400" rtl="0" eaLnBrk="1" latinLnBrk="0" hangingPunct="1">
+              <a:lnSpc>
+                <a:spcPct val="90000"/>
+              </a:lnSpc>
+              <a:spcBef>
+                <a:spcPts val="1000"/>
+              </a:spcBef>
+              <a:buFont typeface="Arial" panose="020B0604020202020204" pitchFamily="34" charset="0"/>
+              <a:buChar char="•"/>
+              <a:defRPr sz="2800" kern="1200">
+                <a:solidFill>
+                  <a:schemeClr val="tx1"/>
+                </a:solidFill>
+                <a:latin typeface="+mn-lt"/>
+                <a:ea typeface="+mn-ea"/>
+                <a:cs typeface="+mn-cs"/>
+              </a:defRPr>
+            </a:lvl1pPr>
+            <a:lvl2pPr marL="685800" indent="-228600" algn="l" defTabSz="914400" rtl="0" eaLnBrk="1" latinLnBrk="0" hangingPunct="1">
+              <a:lnSpc>
+                <a:spcPct val="90000"/>
+              </a:lnSpc>
+              <a:spcBef>
+                <a:spcPts val="500"/>
+              </a:spcBef>
+              <a:buFont typeface="Arial" panose="020B0604020202020204" pitchFamily="34" charset="0"/>
+              <a:buChar char="•"/>
+              <a:defRPr sz="2400" kern="1200">
+                <a:solidFill>
+                  <a:schemeClr val="tx1"/>
+                </a:solidFill>
+                <a:latin typeface="+mn-lt"/>
+                <a:ea typeface="+mn-ea"/>
+                <a:cs typeface="+mn-cs"/>
+              </a:defRPr>
+            </a:lvl2pPr>
+            <a:lvl3pPr marL="1143000" indent="-228600" algn="l" defTabSz="914400" rtl="0" eaLnBrk="1" latinLnBrk="0" hangingPunct="1">
+              <a:lnSpc>
+                <a:spcPct val="90000"/>
+              </a:lnSpc>
+              <a:spcBef>
+                <a:spcPts val="500"/>
+              </a:spcBef>
+              <a:buFont typeface="Arial" panose="020B0604020202020204" pitchFamily="34" charset="0"/>
+              <a:buChar char="•"/>
+              <a:defRPr sz="2000" kern="1200">
+                <a:solidFill>
+                  <a:schemeClr val="tx1"/>
+                </a:solidFill>
+                <a:latin typeface="+mn-lt"/>
+                <a:ea typeface="+mn-ea"/>
+                <a:cs typeface="+mn-cs"/>
+              </a:defRPr>
+            </a:lvl3pPr>
+            <a:lvl4pPr marL="1600200" indent="-228600" algn="l" defTabSz="914400" rtl="0" eaLnBrk="1" latinLnBrk="0" hangingPunct="1">
+              <a:lnSpc>
+                <a:spcPct val="90000"/>
+              </a:lnSpc>
+              <a:spcBef>
+                <a:spcPts val="500"/>
+              </a:spcBef>
+              <a:buFont typeface="Arial" panose="020B0604020202020204" pitchFamily="34" charset="0"/>
+              <a:buChar char="•"/>
+              <a:defRPr sz="1800" kern="1200">
+                <a:solidFill>
+                  <a:schemeClr val="tx1"/>
+                </a:solidFill>
+                <a:latin typeface="+mn-lt"/>
+                <a:ea typeface="+mn-ea"/>
+                <a:cs typeface="+mn-cs"/>
+              </a:defRPr>
+            </a:lvl4pPr>
+            <a:lvl5pPr marL="2057400" indent="-228600" algn="l" defTabSz="914400" rtl="0" eaLnBrk="1" latinLnBrk="0" hangingPunct="1">
+              <a:lnSpc>
+                <a:spcPct val="90000"/>
+              </a:lnSpc>
+              <a:spcBef>
+                <a:spcPts val="500"/>
+              </a:spcBef>
+              <a:buFont typeface="Arial" panose="020B0604020202020204" pitchFamily="34" charset="0"/>
+              <a:buChar char="•"/>
+              <a:defRPr sz="1800" kern="1200">
+                <a:solidFill>
+                  <a:schemeClr val="tx1"/>
+                </a:solidFill>
+                <a:latin typeface="+mn-lt"/>
+                <a:ea typeface="+mn-ea"/>
+                <a:cs typeface="+mn-cs"/>
+              </a:defRPr>
+            </a:lvl5pPr>
+            <a:lvl6pPr marL="2514600" indent="-228600" algn="l" defTabSz="914400" rtl="0" eaLnBrk="1" latinLnBrk="0" hangingPunct="1">
+              <a:lnSpc>
+                <a:spcPct val="90000"/>
+              </a:lnSpc>
+              <a:spcBef>
+                <a:spcPts val="500"/>
+              </a:spcBef>
+              <a:buFont typeface="Arial" panose="020B0604020202020204" pitchFamily="34" charset="0"/>
+              <a:buChar char="•"/>
+              <a:defRPr sz="1800" kern="1200">
+                <a:solidFill>
+                  <a:schemeClr val="tx1"/>
+                </a:solidFill>
+                <a:latin typeface="+mn-lt"/>
+                <a:ea typeface="+mn-ea"/>
+                <a:cs typeface="+mn-cs"/>
+              </a:defRPr>
+            </a:lvl6pPr>
+            <a:lvl7pPr marL="2971800" indent="-228600" algn="l" defTabSz="914400" rtl="0" eaLnBrk="1" latinLnBrk="0" hangingPunct="1">
+              <a:lnSpc>
+                <a:spcPct val="90000"/>
+              </a:lnSpc>
+              <a:spcBef>
+                <a:spcPts val="500"/>
+              </a:spcBef>
+              <a:buFont typeface="Arial" panose="020B0604020202020204" pitchFamily="34" charset="0"/>
+              <a:buChar char="•"/>
+              <a:defRPr sz="1800" kern="1200">
+                <a:solidFill>
+                  <a:schemeClr val="tx1"/>
+                </a:solidFill>
+                <a:latin typeface="+mn-lt"/>
+                <a:ea typeface="+mn-ea"/>
+                <a:cs typeface="+mn-cs"/>
+              </a:defRPr>
+            </a:lvl7pPr>
+            <a:lvl8pPr marL="3429000" indent="-228600" algn="l" defTabSz="914400" rtl="0" eaLnBrk="1" latinLnBrk="0" hangingPunct="1">
+              <a:lnSpc>
+                <a:spcPct val="90000"/>
+              </a:lnSpc>
+              <a:spcBef>
+                <a:spcPts val="500"/>
+              </a:spcBef>
+              <a:buFont typeface="Arial" panose="020B0604020202020204" pitchFamily="34" charset="0"/>
+              <a:buChar char="•"/>
+              <a:defRPr sz="1800" kern="1200">
+                <a:solidFill>
+                  <a:schemeClr val="tx1"/>
+                </a:solidFill>
+                <a:latin typeface="+mn-lt"/>
+                <a:ea typeface="+mn-ea"/>
+                <a:cs typeface="+mn-cs"/>
+              </a:defRPr>
+            </a:lvl8pPr>
+            <a:lvl9pPr marL="3886200" indent="-228600" algn="l" defTabSz="914400" rtl="0" eaLnBrk="1" latinLnBrk="0" hangingPunct="1">
+              <a:lnSpc>
+                <a:spcPct val="90000"/>
+              </a:lnSpc>
+              <a:spcBef>
+                <a:spcPts val="500"/>
+              </a:spcBef>
+              <a:buFont typeface="Arial" panose="020B0604020202020204" pitchFamily="34" charset="0"/>
+              <a:buChar char="•"/>
+              <a:defRPr sz="1800" kern="1200">
+                <a:solidFill>
+                  <a:schemeClr val="tx1"/>
+                </a:solidFill>
+                <a:latin typeface="+mn-lt"/>
+                <a:ea typeface="+mn-ea"/>
+                <a:cs typeface="+mn-cs"/>
+              </a:defRPr>
+            </a:lvl9pPr>
+          </a:lstStyle>
+          <a:p>
+            <a:pPr marL="0" indent="0">
+              <a:buNone/>
+            </a:pPr>
+            <a:r>
+              <a:rPr lang="es-ES" sz="2000" dirty="0"/>
+              <a:t>Procesos de punto</a:t>
+            </a:r>
+          </a:p>
+        </p:txBody>
+      </p:sp>
+      <p:sp>
+        <p:nvSpPr>
+          <p:cNvPr id="13" name="Marcador de texto 3">
+            <a:extLst>
+              <a:ext uri="{FF2B5EF4-FFF2-40B4-BE49-F238E27FC236}">
+                <a16:creationId xmlns:a16="http://schemas.microsoft.com/office/drawing/2014/main" id="{8C54214F-A487-4DFC-B873-76376DEA4DB2}"/>
+              </a:ext>
+            </a:extLst>
+          </p:cNvPr>
+          <p:cNvSpPr txBox="1">
+            <a:spLocks/>
+          </p:cNvSpPr>
+          <p:nvPr/>
+        </p:nvSpPr>
+        <p:spPr>
+          <a:xfrm>
+            <a:off x="7858861" y="4537363"/>
+            <a:ext cx="2357188" cy="454891"/>
+          </a:xfrm>
+          <a:prstGeom prst="rect">
+            <a:avLst/>
+          </a:prstGeom>
+        </p:spPr>
+        <p:txBody>
+          <a:bodyPr/>
+          <a:lstStyle>
+            <a:lvl1pPr marL="228600" indent="-228600" algn="l" defTabSz="914400" rtl="0" eaLnBrk="1" latinLnBrk="0" hangingPunct="1">
+              <a:lnSpc>
+                <a:spcPct val="90000"/>
+              </a:lnSpc>
+              <a:spcBef>
+                <a:spcPts val="1000"/>
+              </a:spcBef>
+              <a:buFont typeface="Arial" panose="020B0604020202020204" pitchFamily="34" charset="0"/>
+              <a:buChar char="•"/>
+              <a:defRPr sz="2800" kern="1200">
+                <a:solidFill>
+                  <a:schemeClr val="tx1"/>
+                </a:solidFill>
+                <a:latin typeface="+mn-lt"/>
+                <a:ea typeface="+mn-ea"/>
+                <a:cs typeface="+mn-cs"/>
+              </a:defRPr>
+            </a:lvl1pPr>
+            <a:lvl2pPr marL="685800" indent="-228600" algn="l" defTabSz="914400" rtl="0" eaLnBrk="1" latinLnBrk="0" hangingPunct="1">
+              <a:lnSpc>
+                <a:spcPct val="90000"/>
+              </a:lnSpc>
+              <a:spcBef>
+                <a:spcPts val="500"/>
+              </a:spcBef>
+              <a:buFont typeface="Arial" panose="020B0604020202020204" pitchFamily="34" charset="0"/>
+              <a:buChar char="•"/>
+              <a:defRPr sz="2400" kern="1200">
+                <a:solidFill>
+                  <a:schemeClr val="tx1"/>
+                </a:solidFill>
+                <a:latin typeface="+mn-lt"/>
+                <a:ea typeface="+mn-ea"/>
+                <a:cs typeface="+mn-cs"/>
+              </a:defRPr>
+            </a:lvl2pPr>
+            <a:lvl3pPr marL="1143000" indent="-228600" algn="l" defTabSz="914400" rtl="0" eaLnBrk="1" latinLnBrk="0" hangingPunct="1">
+              <a:lnSpc>
+                <a:spcPct val="90000"/>
+              </a:lnSpc>
+              <a:spcBef>
+                <a:spcPts val="500"/>
+              </a:spcBef>
+              <a:buFont typeface="Arial" panose="020B0604020202020204" pitchFamily="34" charset="0"/>
+              <a:buChar char="•"/>
+              <a:defRPr sz="2000" kern="1200">
+                <a:solidFill>
+                  <a:schemeClr val="tx1"/>
+                </a:solidFill>
+                <a:latin typeface="+mn-lt"/>
+                <a:ea typeface="+mn-ea"/>
+                <a:cs typeface="+mn-cs"/>
+              </a:defRPr>
+            </a:lvl3pPr>
+            <a:lvl4pPr marL="1600200" indent="-228600" algn="l" defTabSz="914400" rtl="0" eaLnBrk="1" latinLnBrk="0" hangingPunct="1">
+              <a:lnSpc>
+                <a:spcPct val="90000"/>
+              </a:lnSpc>
+              <a:spcBef>
+                <a:spcPts val="500"/>
+              </a:spcBef>
+              <a:buFont typeface="Arial" panose="020B0604020202020204" pitchFamily="34" charset="0"/>
+              <a:buChar char="•"/>
+              <a:defRPr sz="1800" kern="1200">
+                <a:solidFill>
+                  <a:schemeClr val="tx1"/>
+                </a:solidFill>
+                <a:latin typeface="+mn-lt"/>
+                <a:ea typeface="+mn-ea"/>
+                <a:cs typeface="+mn-cs"/>
+              </a:defRPr>
+            </a:lvl4pPr>
+            <a:lvl5pPr marL="2057400" indent="-228600" algn="l" defTabSz="914400" rtl="0" eaLnBrk="1" latinLnBrk="0" hangingPunct="1">
+              <a:lnSpc>
+                <a:spcPct val="90000"/>
+              </a:lnSpc>
+              <a:spcBef>
+                <a:spcPts val="500"/>
+              </a:spcBef>
+              <a:buFont typeface="Arial" panose="020B0604020202020204" pitchFamily="34" charset="0"/>
+              <a:buChar char="•"/>
+              <a:defRPr sz="1800" kern="1200">
+                <a:solidFill>
+                  <a:schemeClr val="tx1"/>
+                </a:solidFill>
+                <a:latin typeface="+mn-lt"/>
+                <a:ea typeface="+mn-ea"/>
+                <a:cs typeface="+mn-cs"/>
+              </a:defRPr>
+            </a:lvl5pPr>
+            <a:lvl6pPr marL="2514600" indent="-228600" algn="l" defTabSz="914400" rtl="0" eaLnBrk="1" latinLnBrk="0" hangingPunct="1">
+              <a:lnSpc>
+                <a:spcPct val="90000"/>
+              </a:lnSpc>
+              <a:spcBef>
+                <a:spcPts val="500"/>
+              </a:spcBef>
+              <a:buFont typeface="Arial" panose="020B0604020202020204" pitchFamily="34" charset="0"/>
+              <a:buChar char="•"/>
+              <a:defRPr sz="1800" kern="1200">
+                <a:solidFill>
+                  <a:schemeClr val="tx1"/>
+                </a:solidFill>
+                <a:latin typeface="+mn-lt"/>
+                <a:ea typeface="+mn-ea"/>
+                <a:cs typeface="+mn-cs"/>
+              </a:defRPr>
+            </a:lvl6pPr>
+            <a:lvl7pPr marL="2971800" indent="-228600" algn="l" defTabSz="914400" rtl="0" eaLnBrk="1" latinLnBrk="0" hangingPunct="1">
+              <a:lnSpc>
+                <a:spcPct val="90000"/>
+              </a:lnSpc>
+              <a:spcBef>
+                <a:spcPts val="500"/>
+              </a:spcBef>
+              <a:buFont typeface="Arial" panose="020B0604020202020204" pitchFamily="34" charset="0"/>
+              <a:buChar char="•"/>
+              <a:defRPr sz="1800" kern="1200">
+                <a:solidFill>
+                  <a:schemeClr val="tx1"/>
+                </a:solidFill>
+                <a:latin typeface="+mn-lt"/>
+                <a:ea typeface="+mn-ea"/>
+                <a:cs typeface="+mn-cs"/>
+              </a:defRPr>
+            </a:lvl7pPr>
+            <a:lvl8pPr marL="3429000" indent="-228600" algn="l" defTabSz="914400" rtl="0" eaLnBrk="1" latinLnBrk="0" hangingPunct="1">
+              <a:lnSpc>
+                <a:spcPct val="90000"/>
+              </a:lnSpc>
+              <a:spcBef>
+                <a:spcPts val="500"/>
+              </a:spcBef>
+              <a:buFont typeface="Arial" panose="020B0604020202020204" pitchFamily="34" charset="0"/>
+              <a:buChar char="•"/>
+              <a:defRPr sz="1800" kern="1200">
+                <a:solidFill>
+                  <a:schemeClr val="tx1"/>
+                </a:solidFill>
+                <a:latin typeface="+mn-lt"/>
+                <a:ea typeface="+mn-ea"/>
+                <a:cs typeface="+mn-cs"/>
+              </a:defRPr>
+            </a:lvl8pPr>
+            <a:lvl9pPr marL="3886200" indent="-228600" algn="l" defTabSz="914400" rtl="0" eaLnBrk="1" latinLnBrk="0" hangingPunct="1">
+              <a:lnSpc>
+                <a:spcPct val="90000"/>
+              </a:lnSpc>
+              <a:spcBef>
+                <a:spcPts val="500"/>
+              </a:spcBef>
+              <a:buFont typeface="Arial" panose="020B0604020202020204" pitchFamily="34" charset="0"/>
+              <a:buChar char="•"/>
+              <a:defRPr sz="1800" kern="1200">
+                <a:solidFill>
+                  <a:schemeClr val="tx1"/>
+                </a:solidFill>
+                <a:latin typeface="+mn-lt"/>
+                <a:ea typeface="+mn-ea"/>
+                <a:cs typeface="+mn-cs"/>
+              </a:defRPr>
+            </a:lvl9pPr>
+          </a:lstStyle>
+          <a:p>
+            <a:pPr marL="0" indent="0" algn="ctr">
+              <a:buNone/>
+            </a:pPr>
+            <a:r>
+              <a:rPr lang="es-ES" sz="2000" dirty="0"/>
+              <a:t>Procesos de área</a:t>
+            </a:r>
+          </a:p>
+        </p:txBody>
+      </p:sp>
+    </p:spTree>
+    <p:extLst>
+      <p:ext uri="{BB962C8B-B14F-4D97-AF65-F5344CB8AC3E}">
+        <p14:creationId xmlns:p14="http://schemas.microsoft.com/office/powerpoint/2010/main" val="3850137970"/>
+      </p:ext>
+    </p:extLst>
+  </p:cSld>
+  <p:clrMapOvr>
+    <a:masterClrMapping/>
+  </p:clrMapOvr>
+</p:sld>
+</file>
+
+<file path=ppt/slides/slide3.xml><?xml version="1.0" encoding="utf-8"?>
+<p:sld xmlns:a="http://schemas.openxmlformats.org/drawingml/2006/main" xmlns:r="http://schemas.openxmlformats.org/officeDocument/2006/relationships" xmlns:p="http://schemas.openxmlformats.org/presentationml/2006/main">
+  <p:cSld>
+    <p:spTree>
+      <p:nvGrpSpPr>
+        <p:cNvPr id="1" name=""/>
+        <p:cNvGrpSpPr/>
+        <p:nvPr/>
+      </p:nvGrpSpPr>
+      <p:grpSpPr>
+        <a:xfrm>
+          <a:off x="0" y="0"/>
+          <a:ext cx="0" cy="0"/>
+          <a:chOff x="0" y="0"/>
+          <a:chExt cx="0" cy="0"/>
+        </a:xfrm>
+      </p:grpSpPr>
+      <p:sp>
+        <p:nvSpPr>
+          <p:cNvPr id="2" name="Título 1">
+            <a:extLst>
+              <a:ext uri="{FF2B5EF4-FFF2-40B4-BE49-F238E27FC236}">
+                <a16:creationId xmlns:a16="http://schemas.microsoft.com/office/drawing/2014/main" id="{49897F57-1493-499D-AD6B-CCE6F847195A}"/>
+              </a:ext>
+            </a:extLst>
+          </p:cNvPr>
+          <p:cNvSpPr>
+            <a:spLocks noGrp="1"/>
+          </p:cNvSpPr>
+          <p:nvPr>
+            <p:ph type="title"/>
+          </p:nvPr>
+        </p:nvSpPr>
+        <p:spPr/>
+        <p:txBody>
+          <a:bodyPr/>
+          <a:lstStyle/>
+          <a:p>
+            <a:endParaRPr lang="es-ES" dirty="0"/>
+          </a:p>
+        </p:txBody>
+      </p:sp>
+      <p:sp>
+        <p:nvSpPr>
+          <p:cNvPr id="3" name="Marcador de contenido 2">
+            <a:extLst>
+              <a:ext uri="{FF2B5EF4-FFF2-40B4-BE49-F238E27FC236}">
+                <a16:creationId xmlns:a16="http://schemas.microsoft.com/office/drawing/2014/main" id="{89699D92-6402-4147-9B1C-677F4DDCF655}"/>
+              </a:ext>
+            </a:extLst>
+          </p:cNvPr>
+          <p:cNvSpPr>
+            <a:spLocks noGrp="1"/>
+          </p:cNvSpPr>
+          <p:nvPr>
+            <p:ph idx="1"/>
+          </p:nvPr>
+        </p:nvSpPr>
+        <p:spPr/>
+        <p:txBody>
+          <a:bodyPr/>
+          <a:lstStyle/>
+          <a:p>
+            <a:endParaRPr lang="es-ES"/>
+          </a:p>
+        </p:txBody>
+      </p:sp>
+      <p:sp>
+        <p:nvSpPr>
+          <p:cNvPr id="4" name="Marcador de texto 3">
+            <a:extLst>
+              <a:ext uri="{FF2B5EF4-FFF2-40B4-BE49-F238E27FC236}">
+                <a16:creationId xmlns:a16="http://schemas.microsoft.com/office/drawing/2014/main" id="{B3EB63B7-9017-43D3-853A-9D652BB1954F}"/>
+              </a:ext>
+            </a:extLst>
+          </p:cNvPr>
+          <p:cNvSpPr>
+            <a:spLocks noGrp="1"/>
+          </p:cNvSpPr>
+          <p:nvPr>
+            <p:ph type="body" sz="half" idx="2"/>
+          </p:nvPr>
+        </p:nvSpPr>
+        <p:spPr>
+          <a:xfrm>
+            <a:off x="839788" y="2057400"/>
+            <a:ext cx="3932237" cy="454891"/>
+          </a:xfrm>
+        </p:spPr>
+        <p:txBody>
+          <a:bodyPr/>
+          <a:lstStyle/>
+          <a:p>
+            <a:r>
+              <a:rPr lang="es-ES" dirty="0" err="1"/>
+              <a:t>dsfdsf</a:t>
+            </a:r>
+            <a:endParaRPr lang="es-ES" dirty="0"/>
+          </a:p>
+        </p:txBody>
+      </p:sp>
+    </p:spTree>
+    <p:extLst>
+      <p:ext uri="{BB962C8B-B14F-4D97-AF65-F5344CB8AC3E}">
+        <p14:creationId xmlns:p14="http://schemas.microsoft.com/office/powerpoint/2010/main" val="2713378262"/>
+      </p:ext>
+    </p:extLst>
+  </p:cSld>
+  <p:clrMapOvr>
+    <a:masterClrMapping/>
+  </p:clrMapOvr>
+</p:sld>
+</file>
+
 <file path=ppt/theme/theme1.xml><?xml version="1.0" encoding="utf-8"?>
 <a:theme xmlns:a="http://schemas.openxmlformats.org/drawingml/2006/main" name="Tema de Office">
   <a:themeElements>

</xml_diff>